<commit_message>
worked on report and updated site
</commit_message>
<xml_diff>
--- a/Documentation/Weekly Report/week3/CMSC-4920-Group2-Week3.pptx
+++ b/Documentation/Weekly Report/week3/CMSC-4920-Group2-Week3.pptx
@@ -125,6 +125,30 @@
 <file path=ppt/changesInfos/changesInfo1.xml><?xml version="1.0" encoding="utf-8"?>
 <pc:chgInfo xmlns:a="http://schemas.openxmlformats.org/drawingml/2006/main" xmlns:r="http://schemas.openxmlformats.org/officeDocument/2006/relationships" xmlns:ac="http://schemas.microsoft.com/office/drawing/2013/main/command" xmlns:pc="http://schemas.microsoft.com/office/powerpoint/2013/main/command">
   <pc:docChgLst>
+    <pc:chgData name="Margo Bonal" userId="18c9fa0f-b53d-478b-9dc0-6ad88786c19f" providerId="ADAL" clId="{93D479E5-F67F-4B8A-A78F-A0B574A116B6}"/>
+    <pc:docChg chg="modSld">
+      <pc:chgData name="Margo Bonal" userId="18c9fa0f-b53d-478b-9dc0-6ad88786c19f" providerId="ADAL" clId="{93D479E5-F67F-4B8A-A78F-A0B574A116B6}" dt="2026-02-01T23:20:15.838" v="3" actId="20577"/>
+      <pc:docMkLst>
+        <pc:docMk/>
+      </pc:docMkLst>
+      <pc:sldChg chg="modSp mod">
+        <pc:chgData name="Margo Bonal" userId="18c9fa0f-b53d-478b-9dc0-6ad88786c19f" providerId="ADAL" clId="{93D479E5-F67F-4B8A-A78F-A0B574A116B6}" dt="2026-02-01T23:20:15.838" v="3" actId="20577"/>
+        <pc:sldMkLst>
+          <pc:docMk/>
+          <pc:sldMk cId="2435356693" sldId="259"/>
+        </pc:sldMkLst>
+        <pc:spChg chg="mod">
+          <ac:chgData name="Margo Bonal" userId="18c9fa0f-b53d-478b-9dc0-6ad88786c19f" providerId="ADAL" clId="{93D479E5-F67F-4B8A-A78F-A0B574A116B6}" dt="2026-02-01T23:20:15.838" v="3" actId="20577"/>
+          <ac:spMkLst>
+            <pc:docMk/>
+            <pc:sldMk cId="2435356693" sldId="259"/>
+            <ac:spMk id="6" creationId="{997BBA28-00C8-8F7A-94FF-B6415063757E}"/>
+          </ac:spMkLst>
+        </pc:spChg>
+      </pc:sldChg>
+    </pc:docChg>
+  </pc:docChgLst>
+  <pc:docChgLst>
     <pc:chgData name="John Gerega" userId="bd3e1e46fb6a714b" providerId="LiveId" clId="{45F0C402-C550-4C82-B31D-5B32217A5E94}"/>
     <pc:docChg chg="custSel addSld delSld modSld">
       <pc:chgData name="John Gerega" userId="bd3e1e46fb6a714b" providerId="LiveId" clId="{45F0C402-C550-4C82-B31D-5B32217A5E94}" dt="2026-01-29T19:30:17.690" v="506" actId="1076"/>
@@ -201,30 +225,6 @@
         </pc:spChg>
         <pc:spChg chg="mod">
           <ac:chgData name="John Gerega" userId="bd3e1e46fb6a714b" providerId="LiveId" clId="{45F0C402-C550-4C82-B31D-5B32217A5E94}" dt="2026-01-27T20:24:50.420" v="172" actId="20577"/>
-          <ac:spMkLst>
-            <pc:docMk/>
-            <pc:sldMk cId="2435356693" sldId="259"/>
-            <ac:spMk id="6" creationId="{997BBA28-00C8-8F7A-94FF-B6415063757E}"/>
-          </ac:spMkLst>
-        </pc:spChg>
-      </pc:sldChg>
-    </pc:docChg>
-  </pc:docChgLst>
-  <pc:docChgLst>
-    <pc:chgData name="Margo Bonal" userId="18c9fa0f-b53d-478b-9dc0-6ad88786c19f" providerId="ADAL" clId="{93D479E5-F67F-4B8A-A78F-A0B574A116B6}"/>
-    <pc:docChg chg="modSld">
-      <pc:chgData name="Margo Bonal" userId="18c9fa0f-b53d-478b-9dc0-6ad88786c19f" providerId="ADAL" clId="{93D479E5-F67F-4B8A-A78F-A0B574A116B6}" dt="2026-02-01T23:20:15.838" v="3" actId="20577"/>
-      <pc:docMkLst>
-        <pc:docMk/>
-      </pc:docMkLst>
-      <pc:sldChg chg="modSp mod">
-        <pc:chgData name="Margo Bonal" userId="18c9fa0f-b53d-478b-9dc0-6ad88786c19f" providerId="ADAL" clId="{93D479E5-F67F-4B8A-A78F-A0B574A116B6}" dt="2026-02-01T23:20:15.838" v="3" actId="20577"/>
-        <pc:sldMkLst>
-          <pc:docMk/>
-          <pc:sldMk cId="2435356693" sldId="259"/>
-        </pc:sldMkLst>
-        <pc:spChg chg="mod">
-          <ac:chgData name="Margo Bonal" userId="18c9fa0f-b53d-478b-9dc0-6ad88786c19f" providerId="ADAL" clId="{93D479E5-F67F-4B8A-A78F-A0B574A116B6}" dt="2026-02-01T23:20:15.838" v="3" actId="20577"/>
           <ac:spMkLst>
             <pc:docMk/>
             <pc:sldMk cId="2435356693" sldId="259"/>
@@ -4020,7 +4020,7 @@
           <a:p>
             <a:fld id="{53F7EA64-47A8-4745-A689-3AB1D5C1369D}" type="datetimeFigureOut">
               <a:rPr lang="en-US" smtClean="0"/>
-              <a:t>2/1/2026</a:t>
+              <a:t>2/7/2026</a:t>
             </a:fld>
             <a:endParaRPr lang="en-US"/>
           </a:p>
@@ -4725,7 +4725,7 @@
           <a:p>
             <a:fld id="{713DB78E-3C9A-457B-8BC6-E3BEE2B0AC0A}" type="datetimeFigureOut">
               <a:rPr lang="en-US" smtClean="0"/>
-              <a:t>2/1/2026</a:t>
+              <a:t>2/7/2026</a:t>
             </a:fld>
             <a:endParaRPr lang="en-US"/>
           </a:p>
@@ -4904,7 +4904,7 @@
           <a:p>
             <a:fld id="{713DB78E-3C9A-457B-8BC6-E3BEE2B0AC0A}" type="datetimeFigureOut">
               <a:rPr lang="en-US" smtClean="0"/>
-              <a:t>2/1/2026</a:t>
+              <a:t>2/7/2026</a:t>
             </a:fld>
             <a:endParaRPr lang="en-US"/>
           </a:p>
@@ -5084,7 +5084,7 @@
           <a:p>
             <a:fld id="{713DB78E-3C9A-457B-8BC6-E3BEE2B0AC0A}" type="datetimeFigureOut">
               <a:rPr lang="en-US" smtClean="0"/>
-              <a:t>2/1/2026</a:t>
+              <a:t>2/7/2026</a:t>
             </a:fld>
             <a:endParaRPr lang="en-US"/>
           </a:p>
@@ -5254,7 +5254,7 @@
           <a:p>
             <a:fld id="{713DB78E-3C9A-457B-8BC6-E3BEE2B0AC0A}" type="datetimeFigureOut">
               <a:rPr lang="en-US" smtClean="0"/>
-              <a:t>2/1/2026</a:t>
+              <a:t>2/7/2026</a:t>
             </a:fld>
             <a:endParaRPr lang="en-US"/>
           </a:p>
@@ -5567,7 +5567,7 @@
           <a:p>
             <a:fld id="{713DB78E-3C9A-457B-8BC6-E3BEE2B0AC0A}" type="datetimeFigureOut">
               <a:rPr lang="en-US" smtClean="0"/>
-              <a:t>2/1/2026</a:t>
+              <a:t>2/7/2026</a:t>
             </a:fld>
             <a:endParaRPr lang="en-US"/>
           </a:p>
@@ -5953,7 +5953,7 @@
           <a:p>
             <a:fld id="{713DB78E-3C9A-457B-8BC6-E3BEE2B0AC0A}" type="datetimeFigureOut">
               <a:rPr lang="en-US" smtClean="0"/>
-              <a:t>2/1/2026</a:t>
+              <a:t>2/7/2026</a:t>
             </a:fld>
             <a:endParaRPr lang="en-US"/>
           </a:p>
@@ -6387,7 +6387,7 @@
           <a:p>
             <a:fld id="{713DB78E-3C9A-457B-8BC6-E3BEE2B0AC0A}" type="datetimeFigureOut">
               <a:rPr lang="en-US" smtClean="0"/>
-              <a:t>2/1/2026</a:t>
+              <a:t>2/7/2026</a:t>
             </a:fld>
             <a:endParaRPr lang="en-US"/>
           </a:p>
@@ -6505,7 +6505,7 @@
           <a:p>
             <a:fld id="{713DB78E-3C9A-457B-8BC6-E3BEE2B0AC0A}" type="datetimeFigureOut">
               <a:rPr lang="en-US" smtClean="0"/>
-              <a:t>2/1/2026</a:t>
+              <a:t>2/7/2026</a:t>
             </a:fld>
             <a:endParaRPr lang="en-US"/>
           </a:p>
@@ -6600,7 +6600,7 @@
           <a:p>
             <a:fld id="{713DB78E-3C9A-457B-8BC6-E3BEE2B0AC0A}" type="datetimeFigureOut">
               <a:rPr lang="en-US" smtClean="0"/>
-              <a:t>2/1/2026</a:t>
+              <a:t>2/7/2026</a:t>
             </a:fld>
             <a:endParaRPr lang="en-US"/>
           </a:p>
@@ -6950,7 +6950,7 @@
           <a:p>
             <a:fld id="{713DB78E-3C9A-457B-8BC6-E3BEE2B0AC0A}" type="datetimeFigureOut">
               <a:rPr lang="en-US" smtClean="0"/>
-              <a:t>2/1/2026</a:t>
+              <a:t>2/7/2026</a:t>
             </a:fld>
             <a:endParaRPr lang="en-US"/>
           </a:p>
@@ -7375,7 +7375,7 @@
           <a:p>
             <a:fld id="{713DB78E-3C9A-457B-8BC6-E3BEE2B0AC0A}" type="datetimeFigureOut">
               <a:rPr lang="en-US" smtClean="0"/>
-              <a:t>2/1/2026</a:t>
+              <a:t>2/7/2026</a:t>
             </a:fld>
             <a:endParaRPr lang="en-US"/>
           </a:p>
@@ -7656,7 +7656,7 @@
           <a:p>
             <a:fld id="{713DB78E-3C9A-457B-8BC6-E3BEE2B0AC0A}" type="datetimeFigureOut">
               <a:rPr lang="en-US" smtClean="0"/>
-              <a:t>2/1/2026</a:t>
+              <a:t>2/7/2026</a:t>
             </a:fld>
             <a:endParaRPr lang="en-US"/>
           </a:p>

</xml_diff>